<commit_message>
fix a bug in global app V2.4 (maybe due to file corruption)
</commit_message>
<xml_diff>
--- a/global_app_V2/www/CaPO4_intro.pptx
+++ b/global_app_V2/www/CaPO4_intro.pptx
@@ -8202,13 +8202,13 @@
               </a:ext>
             </a:extLst>
           </a:blip>
-          <a:srcRect l="11560" t="49497" r="11692" b="9571"/>
+          <a:srcRect l="11560" t="6832" r="11692" b="9570"/>
           <a:stretch/>
         </p:blipFill>
         <p:spPr>
           <a:xfrm>
-            <a:off x="0" y="4274378"/>
-            <a:ext cx="6858000" cy="7917621"/>
+            <a:off x="0" y="0"/>
+            <a:ext cx="6858000" cy="12192000"/>
           </a:xfrm>
           <a:prstGeom prst="rect">
             <a:avLst/>
@@ -8545,35 +8545,6 @@
           <a:xfrm>
             <a:off x="8532219" y="7662747"/>
             <a:ext cx="626465" cy="530086"/>
-          </a:xfrm>
-          <a:prstGeom prst="rect">
-            <a:avLst/>
-          </a:prstGeom>
-        </p:spPr>
-      </p:pic>
-      <p:pic>
-        <p:nvPicPr>
-          <p:cNvPr id="38" name="Image 37"/>
-          <p:cNvPicPr>
-            <a:picLocks noChangeAspect="1"/>
-          </p:cNvPicPr>
-          <p:nvPr/>
-        </p:nvPicPr>
-        <p:blipFill rotWithShape="1">
-          <a:blip r:embed="rId8">
-            <a:extLst>
-              <a:ext uri="{28A0092B-C50C-407E-A947-70E740481C1C}">
-                <a14:useLocalDpi xmlns:a14="http://schemas.microsoft.com/office/drawing/2010/main" val="0"/>
-              </a:ext>
-            </a:extLst>
-          </a:blip>
-          <a:srcRect b="64875"/>
-          <a:stretch/>
-        </p:blipFill>
-        <p:spPr>
-          <a:xfrm>
-            <a:off x="674102" y="104693"/>
-            <a:ext cx="5532571" cy="3506928"/>
           </a:xfrm>
           <a:prstGeom prst="rect">
             <a:avLst/>
@@ -10211,7 +10182,7 @@
                             </p:stCondLst>
                             <p:childTnLst>
                               <p:par>
-                                <p:cTn id="94" presetID="42" presetClass="path" presetSubtype="0" repeatCount="5000" accel="50000" decel="50000" fill="hold" nodeType="clickEffect">
+                                <p:cTn id="94" presetID="42" presetClass="path" presetSubtype="0" repeatCount="2000" accel="50000" decel="50000" fill="hold" nodeType="clickEffect">
                                   <p:stCondLst>
                                     <p:cond delay="0"/>
                                   </p:stCondLst>
@@ -10601,7 +10572,7 @@
                                 </p:cTn>
                               </p:par>
                               <p:par>
-                                <p:cTn id="128" presetID="9" presetClass="exit" presetSubtype="0" fill="hold" nodeType="withEffect">
+                                <p:cTn id="128" presetID="9" presetClass="exit" presetSubtype="0" fill="hold" grpId="1" nodeType="withEffect">
                                   <p:stCondLst>
                                     <p:cond delay="0"/>
                                   </p:stCondLst>
@@ -10610,7 +10581,7 @@
                                       <p:cBhvr>
                                         <p:cTn id="129" dur="500"/>
                                         <p:tgtEl>
-                                          <p:spTgt spid="38"/>
+                                          <p:spTgt spid="53"/>
                                         </p:tgtEl>
                                       </p:cBhvr>
                                     </p:animEffect>
@@ -10622,7 +10593,7 @@
                                           </p:stCondLst>
                                         </p:cTn>
                                         <p:tgtEl>
-                                          <p:spTgt spid="38"/>
+                                          <p:spTgt spid="53"/>
                                         </p:tgtEl>
                                         <p:attrNameLst>
                                           <p:attrName>style.visibility</p:attrName>
@@ -10636,7 +10607,7 @@
                                 </p:cTn>
                               </p:par>
                               <p:par>
-                                <p:cTn id="131" presetID="9" presetClass="exit" presetSubtype="0" fill="hold" grpId="1" nodeType="withEffect">
+                                <p:cTn id="131" presetID="9" presetClass="exit" presetSubtype="0" fill="hold" grpId="0" nodeType="withEffect">
                                   <p:stCondLst>
                                     <p:cond delay="0"/>
                                   </p:stCondLst>
@@ -10645,7 +10616,7 @@
                                       <p:cBhvr>
                                         <p:cTn id="132" dur="500"/>
                                         <p:tgtEl>
-                                          <p:spTgt spid="53"/>
+                                          <p:spTgt spid="51"/>
                                         </p:tgtEl>
                                       </p:cBhvr>
                                     </p:animEffect>
@@ -10657,7 +10628,7 @@
                                           </p:stCondLst>
                                         </p:cTn>
                                         <p:tgtEl>
-                                          <p:spTgt spid="53"/>
+                                          <p:spTgt spid="51"/>
                                         </p:tgtEl>
                                         <p:attrNameLst>
                                           <p:attrName>style.visibility</p:attrName>
@@ -10671,7 +10642,7 @@
                                 </p:cTn>
                               </p:par>
                               <p:par>
-                                <p:cTn id="134" presetID="9" presetClass="exit" presetSubtype="0" fill="hold" grpId="0" nodeType="withEffect">
+                                <p:cTn id="134" presetID="9" presetClass="exit" presetSubtype="0" fill="hold" grpId="2" nodeType="withEffect">
                                   <p:stCondLst>
                                     <p:cond delay="0"/>
                                   </p:stCondLst>
@@ -10706,7 +10677,7 @@
                                 </p:cTn>
                               </p:par>
                               <p:par>
-                                <p:cTn id="137" presetID="9" presetClass="exit" presetSubtype="0" fill="hold" grpId="2" nodeType="withEffect">
+                                <p:cTn id="137" presetID="9" presetClass="exit" presetSubtype="0" fill="hold" nodeType="withEffect">
                                   <p:stCondLst>
                                     <p:cond delay="0"/>
                                   </p:stCondLst>
@@ -10715,48 +10686,13 @@
                                       <p:cBhvr>
                                         <p:cTn id="138" dur="500"/>
                                         <p:tgtEl>
-                                          <p:spTgt spid="51"/>
+                                          <p:spTgt spid="2"/>
                                         </p:tgtEl>
                                       </p:cBhvr>
                                     </p:animEffect>
                                     <p:set>
                                       <p:cBhvr>
                                         <p:cTn id="139" dur="1" fill="hold">
-                                          <p:stCondLst>
-                                            <p:cond delay="499"/>
-                                          </p:stCondLst>
-                                        </p:cTn>
-                                        <p:tgtEl>
-                                          <p:spTgt spid="51"/>
-                                        </p:tgtEl>
-                                        <p:attrNameLst>
-                                          <p:attrName>style.visibility</p:attrName>
-                                        </p:attrNameLst>
-                                      </p:cBhvr>
-                                      <p:to>
-                                        <p:strVal val="hidden"/>
-                                      </p:to>
-                                    </p:set>
-                                  </p:childTnLst>
-                                </p:cTn>
-                              </p:par>
-                              <p:par>
-                                <p:cTn id="140" presetID="9" presetClass="exit" presetSubtype="0" fill="hold" nodeType="withEffect">
-                                  <p:stCondLst>
-                                    <p:cond delay="0"/>
-                                  </p:stCondLst>
-                                  <p:childTnLst>
-                                    <p:animEffect transition="out" filter="dissolve">
-                                      <p:cBhvr>
-                                        <p:cTn id="141" dur="500"/>
-                                        <p:tgtEl>
-                                          <p:spTgt spid="2"/>
-                                        </p:tgtEl>
-                                      </p:cBhvr>
-                                    </p:animEffect>
-                                    <p:set>
-                                      <p:cBhvr>
-                                        <p:cTn id="142" dur="1" fill="hold">
                                           <p:stCondLst>
                                             <p:cond delay="499"/>
                                           </p:stCondLst>

</xml_diff>